<commit_message>
Update 1821005_中間発表_テンプレ - (案).pptx
</commit_message>
<xml_diff>
--- a/1821005_中間発表_テンプレ - (案).pptx
+++ b/1821005_中間発表_テンプレ - (案).pptx
@@ -4130,7 +4130,55 @@
           <a:bodyPr/>
           <a:lstStyle/>
           <a:p>
-            <a:endParaRPr kumimoji="1" lang="ja-JP" altLang="en-US"/>
+            <a:r>
+              <a:rPr kumimoji="1" lang="en-US" altLang="ja-JP" dirty="0" smtClean="0"/>
+              <a:t>SIFT</a:t>
+            </a:r>
+            <a:r>
+              <a:rPr kumimoji="1" lang="ja-JP" altLang="en-US" dirty="0" err="1" smtClean="0"/>
+              <a:t>、</a:t>
+            </a:r>
+            <a:r>
+              <a:rPr kumimoji="1" lang="ja-JP" altLang="en-US" dirty="0" smtClean="0"/>
+              <a:t>どこが特徴ベクトルなのか、説明があるといい</a:t>
+            </a:r>
+            <a:endParaRPr kumimoji="1" lang="en-US" altLang="ja-JP" dirty="0" smtClean="0"/>
+          </a:p>
+          <a:p>
+            <a:endParaRPr lang="en-US" altLang="ja-JP" dirty="0"/>
+          </a:p>
+          <a:p>
+            <a:r>
+              <a:rPr kumimoji="1" lang="en-US" altLang="ja-JP" dirty="0" smtClean="0"/>
+              <a:t>SIFT</a:t>
+            </a:r>
+            <a:r>
+              <a:rPr kumimoji="1" lang="ja-JP" altLang="en-US" dirty="0" smtClean="0"/>
+              <a:t>は固定で</a:t>
+            </a:r>
+            <a:r>
+              <a:rPr kumimoji="1" lang="en-US" altLang="ja-JP" dirty="0" smtClean="0"/>
+              <a:t>(</a:t>
+            </a:r>
+            <a:r>
+              <a:rPr kumimoji="1" lang="ja-JP" altLang="en-US" dirty="0" smtClean="0"/>
+              <a:t>ヒストグラムのような形で出てくる）</a:t>
+            </a:r>
+            <a:endParaRPr kumimoji="1" lang="en-US" altLang="ja-JP" dirty="0" smtClean="0"/>
+          </a:p>
+          <a:p>
+            <a:r>
+              <a:rPr lang="en-US" altLang="ja-JP" dirty="0" smtClean="0"/>
+              <a:t>SIFT</a:t>
+            </a:r>
+            <a:r>
+              <a:rPr lang="ja-JP" altLang="en-US" dirty="0" smtClean="0"/>
+              <a:t>を比較対象にして、ディープラーニングで検出される画像の方を次元数をいじる</a:t>
+            </a:r>
+            <a:endParaRPr lang="en-US" altLang="ja-JP" dirty="0" smtClean="0"/>
+          </a:p>
+          <a:p>
+            <a:endParaRPr kumimoji="1" lang="ja-JP" altLang="en-US" dirty="0"/>
           </a:p>
         </p:txBody>
       </p:sp>
@@ -4340,44 +4388,43 @@
           <a:lstStyle/>
           <a:p>
             <a:r>
+              <a:rPr lang="en-US" altLang="ja-JP" dirty="0" smtClean="0"/>
+              <a:t>Twitter </a:t>
+            </a:r>
+            <a:r>
               <a:rPr lang="ja-JP" altLang="ja-JP" dirty="0"/>
-              <a:t>近年</a:t>
+              <a:t>や </a:t>
+            </a:r>
+            <a:r>
+              <a:rPr lang="en-US" altLang="ja-JP" dirty="0"/>
+              <a:t>Instagram</a:t>
+            </a:r>
+            <a:r>
+              <a:rPr lang="ja-JP" altLang="ja-JP" dirty="0"/>
+              <a:t>などのソーシャルネットワーキングサービスの普及に伴い</a:t>
             </a:r>
             <a:r>
               <a:rPr lang="ja-JP" altLang="en-US" dirty="0"/>
               <a:t>、</a:t>
             </a:r>
             <a:r>
-              <a:rPr lang="en-US" altLang="ja-JP" dirty="0"/>
-              <a:t>Twitter </a:t>
-            </a:r>
-            <a:r>
-              <a:rPr lang="ja-JP" altLang="ja-JP" dirty="0"/>
-              <a:t>や </a:t>
-            </a:r>
-            <a:r>
-              <a:rPr lang="en-US" altLang="ja-JP" dirty="0"/>
-              <a:t>Instagram</a:t>
-            </a:r>
-            <a:r>
-              <a:rPr lang="ja-JP" altLang="ja-JP" dirty="0"/>
-              <a:t>などのソーシャルネットワーキングサービスの普及に伴い</a:t>
-            </a:r>
-            <a:r>
-              <a:rPr lang="ja-JP" altLang="en-US" dirty="0"/>
-              <a:t>、</a:t>
-            </a:r>
-            <a:r>
               <a:rPr lang="ja-JP" altLang="ja-JP" dirty="0"/>
               <a:t>我々のアクセスすることができる画像が急激に増加している</a:t>
             </a:r>
             <a:r>
-              <a:rPr lang="ja-JP" altLang="en-US" dirty="0"/>
+              <a:rPr lang="ja-JP" altLang="en-US" dirty="0" smtClean="0"/>
               <a:t>。</a:t>
             </a:r>
+            <a:endParaRPr lang="en-US" altLang="ja-JP" dirty="0" smtClean="0"/>
+          </a:p>
+          <a:p>
+            <a:r>
+              <a:rPr lang="ja-JP" altLang="ja-JP" dirty="0" smtClean="0"/>
+              <a:t>その</a:t>
+            </a:r>
             <a:r>
               <a:rPr lang="ja-JP" altLang="ja-JP" dirty="0"/>
-              <a:t>そのような大量の画像を用いることで</a:t>
+              <a:t>ような大量の画像を用いることで</a:t>
             </a:r>
             <a:r>
               <a:rPr lang="ja-JP" altLang="en-US" dirty="0"/>
@@ -4694,7 +4741,15 @@
           <a:p>
             <a:r>
               <a:rPr lang="ja-JP" altLang="en-US" dirty="0" smtClean="0"/>
-              <a:t>大量のデータがあふれる中、高次元のデータを認識性能を向上させつつも、計算コストを抑えることでより良いがそう認識を行う。</a:t>
+              <a:t>大量のデータがあふれる中、高次元のデータを認識性能を向上させつつも、計算コストを抑えることでより良い</a:t>
+            </a:r>
+            <a:r>
+              <a:rPr lang="ja-JP" altLang="en-US" dirty="0"/>
+              <a:t>画像</a:t>
+            </a:r>
+            <a:r>
+              <a:rPr lang="ja-JP" altLang="en-US" dirty="0" smtClean="0"/>
+              <a:t>認識を行う。</a:t>
             </a:r>
             <a:endParaRPr lang="en-US" altLang="ja-JP" dirty="0" smtClean="0"/>
           </a:p>
@@ -4923,7 +4978,7 @@
             </a:r>
             <a:r>
               <a:rPr lang="ja-JP" altLang="en-US" dirty="0" smtClean="0"/>
-              <a:t>認識の認識性能を高く保ちつつも、計算コストをできるだけ抑えられる方法を提案</a:t>
+              <a:t>認識の認識性能を高く保ちつつも、計算コストをできるだけ抑えられる方法を提案する。</a:t>
             </a:r>
             <a:endParaRPr lang="en-US" altLang="ja-JP" dirty="0" smtClean="0"/>
           </a:p>
@@ -5070,11 +5125,7 @@
             </a:r>
             <a:r>
               <a:rPr lang="ja-JP" altLang="en-US" dirty="0" smtClean="0"/>
-              <a:t>を用いた特徴量</a:t>
-            </a:r>
-            <a:r>
-              <a:rPr lang="ja-JP" altLang="en-US" dirty="0" smtClean="0"/>
-              <a:t>抽出</a:t>
+              <a:t>を用いた特徴量抽出</a:t>
             </a:r>
             <a:endParaRPr lang="en-US" altLang="ja-JP" dirty="0" smtClean="0"/>
           </a:p>

</xml_diff>